<commit_message>
Added Introduction to DevGuide and modify logic ppt
</commit_message>
<xml_diff>
--- a/docs/diagrams/LogicComponentClassDiagram.pptx
+++ b/docs/diagrams/LogicComponentClassDiagram.pptx
@@ -126,10 +126,6 @@
 </p:presentation>
 </file>
 
-<file path=ppt/revisionInfo.xml><?xml version="1.0" encoding="utf-8"?>
-<p1510:revInfo xmlns:a="http://schemas.openxmlformats.org/drawingml/2006/main" xmlns:r="http://schemas.openxmlformats.org/officeDocument/2006/relationships" xmlns:p1510="http://schemas.microsoft.com/office/powerpoint/2015/10/main"/>
-</file>
-
 <file path=ppt/notesMasters/notesMaster1.xml><?xml version="1.0" encoding="utf-8"?>
 <p:notesMaster xmlns:a="http://schemas.openxmlformats.org/drawingml/2006/main" xmlns:r="http://schemas.openxmlformats.org/officeDocument/2006/relationships" xmlns:p="http://schemas.openxmlformats.org/presentationml/2006/main">
   <p:cSld>
@@ -212,7 +208,7 @@
           <a:p>
             <a:fld id="{F5CC4B3F-88C1-4FFA-B1B6-F41C21DC6924}" type="datetimeFigureOut">
               <a:rPr lang="en-US" smtClean="0"/>
-              <a:t>7/20/17</a:t>
+              <a:t>3/25/2018</a:t>
             </a:fld>
             <a:endParaRPr lang="en-US"/>
           </a:p>
@@ -658,7 +654,7 @@
           <a:p>
             <a:fld id="{78C97017-6FC3-485B-9764-EAC9E56C1D49}" type="datetimeFigureOut">
               <a:rPr lang="en-US" smtClean="0"/>
-              <a:t>7/20/17</a:t>
+              <a:t>3/25/2018</a:t>
             </a:fld>
             <a:endParaRPr lang="en-US"/>
           </a:p>
@@ -826,7 +822,7 @@
           <a:p>
             <a:fld id="{78C97017-6FC3-485B-9764-EAC9E56C1D49}" type="datetimeFigureOut">
               <a:rPr lang="en-US" smtClean="0"/>
-              <a:t>7/20/17</a:t>
+              <a:t>3/25/2018</a:t>
             </a:fld>
             <a:endParaRPr lang="en-US"/>
           </a:p>
@@ -1004,7 +1000,7 @@
           <a:p>
             <a:fld id="{78C97017-6FC3-485B-9764-EAC9E56C1D49}" type="datetimeFigureOut">
               <a:rPr lang="en-US" smtClean="0"/>
-              <a:t>7/20/17</a:t>
+              <a:t>3/25/2018</a:t>
             </a:fld>
             <a:endParaRPr lang="en-US"/>
           </a:p>
@@ -1172,7 +1168,7 @@
           <a:p>
             <a:fld id="{78C97017-6FC3-485B-9764-EAC9E56C1D49}" type="datetimeFigureOut">
               <a:rPr lang="en-US" smtClean="0"/>
-              <a:t>7/20/17</a:t>
+              <a:t>3/25/2018</a:t>
             </a:fld>
             <a:endParaRPr lang="en-US"/>
           </a:p>
@@ -1417,7 +1413,7 @@
           <a:p>
             <a:fld id="{78C97017-6FC3-485B-9764-EAC9E56C1D49}" type="datetimeFigureOut">
               <a:rPr lang="en-US" smtClean="0"/>
-              <a:t>7/20/17</a:t>
+              <a:t>3/25/2018</a:t>
             </a:fld>
             <a:endParaRPr lang="en-US"/>
           </a:p>
@@ -1702,7 +1698,7 @@
           <a:p>
             <a:fld id="{78C97017-6FC3-485B-9764-EAC9E56C1D49}" type="datetimeFigureOut">
               <a:rPr lang="en-US" smtClean="0"/>
-              <a:t>7/20/17</a:t>
+              <a:t>3/25/2018</a:t>
             </a:fld>
             <a:endParaRPr lang="en-US"/>
           </a:p>
@@ -2121,7 +2117,7 @@
           <a:p>
             <a:fld id="{78C97017-6FC3-485B-9764-EAC9E56C1D49}" type="datetimeFigureOut">
               <a:rPr lang="en-US" smtClean="0"/>
-              <a:t>7/20/17</a:t>
+              <a:t>3/25/2018</a:t>
             </a:fld>
             <a:endParaRPr lang="en-US"/>
           </a:p>
@@ -2238,7 +2234,7 @@
           <a:p>
             <a:fld id="{78C97017-6FC3-485B-9764-EAC9E56C1D49}" type="datetimeFigureOut">
               <a:rPr lang="en-US" smtClean="0"/>
-              <a:t>7/20/17</a:t>
+              <a:t>3/25/2018</a:t>
             </a:fld>
             <a:endParaRPr lang="en-US"/>
           </a:p>
@@ -2333,7 +2329,7 @@
           <a:p>
             <a:fld id="{78C97017-6FC3-485B-9764-EAC9E56C1D49}" type="datetimeFigureOut">
               <a:rPr lang="en-US" smtClean="0"/>
-              <a:t>7/20/17</a:t>
+              <a:t>3/25/2018</a:t>
             </a:fld>
             <a:endParaRPr lang="en-US"/>
           </a:p>
@@ -2608,7 +2604,7 @@
           <a:p>
             <a:fld id="{78C97017-6FC3-485B-9764-EAC9E56C1D49}" type="datetimeFigureOut">
               <a:rPr lang="en-US" smtClean="0"/>
-              <a:t>7/20/17</a:t>
+              <a:t>3/25/2018</a:t>
             </a:fld>
             <a:endParaRPr lang="en-US"/>
           </a:p>
@@ -2860,7 +2856,7 @@
           <a:p>
             <a:fld id="{78C97017-6FC3-485B-9764-EAC9E56C1D49}" type="datetimeFigureOut">
               <a:rPr lang="en-US" smtClean="0"/>
-              <a:t>7/20/17</a:t>
+              <a:t>3/25/2018</a:t>
             </a:fld>
             <a:endParaRPr lang="en-US"/>
           </a:p>
@@ -3071,7 +3067,7 @@
           <a:p>
             <a:fld id="{78C97017-6FC3-485B-9764-EAC9E56C1D49}" type="datetimeFigureOut">
               <a:rPr lang="en-US" smtClean="0"/>
-              <a:t>7/20/17</a:t>
+              <a:t>3/25/2018</a:t>
             </a:fld>
             <a:endParaRPr lang="en-US"/>
           </a:p>
@@ -3607,7 +3603,7 @@
           <a:p>
             <a:pPr algn="ctr"/>
             <a:r>
-              <a:rPr lang="en-US" sz="1050" b="1" dirty="0" err="1" smtClean="0">
+              <a:rPr lang="en-US" sz="1050" b="1" dirty="0" err="1">
                 <a:solidFill>
                   <a:srgbClr val="0070C0"/>
                 </a:solidFill>
@@ -3939,12 +3935,12 @@
           <a:p>
             <a:pPr algn="ctr"/>
             <a:r>
-              <a:rPr lang="en-US" sz="1050" dirty="0" err="1" smtClean="0">
+              <a:rPr lang="en-US" sz="1050" dirty="0" err="1">
                 <a:solidFill>
                   <a:schemeClr val="bg1"/>
                 </a:solidFill>
               </a:rPr>
-              <a:t>AddressBook</a:t>
+              <a:t>DeskBoard</a:t>
             </a:r>
             <a:endParaRPr lang="en-US" sz="1050" dirty="0">
               <a:solidFill>
@@ -5517,7 +5513,7 @@
           <p:cNvPr id="97" name="Rectangle 96">
             <a:extLst>
               <a:ext uri="{FF2B5EF4-FFF2-40B4-BE49-F238E27FC236}">
-                <a16:creationId xmlns="" xmlns:a16="http://schemas.microsoft.com/office/drawing/2014/main" id="{AADE6A0C-89AB-467B-8CEA-5FCF36CE0D21}"/>
+                <a16:creationId xmlns:a16="http://schemas.microsoft.com/office/drawing/2014/main" id="{AADE6A0C-89AB-467B-8CEA-5FCF36CE0D21}"/>
               </a:ext>
             </a:extLst>
           </p:cNvPr>
@@ -5815,7 +5811,7 @@
           <a:p>
             <a:pPr algn="ctr"/>
             <a:r>
-              <a:rPr lang="en-US" sz="1050" b="1" dirty="0" err="1" smtClean="0">
+              <a:rPr lang="en-US" sz="1050" b="1" dirty="0" err="1">
                 <a:solidFill>
                   <a:schemeClr val="bg1"/>
                 </a:solidFill>
@@ -6165,7 +6161,7 @@
           <a:p>
             <a:pPr algn="ctr"/>
             <a:r>
-              <a:rPr lang="en-US" sz="1050" dirty="0" err="1" smtClean="0">
+              <a:rPr lang="en-US" sz="1050" dirty="0" err="1">
                 <a:solidFill>
                   <a:schemeClr val="bg1"/>
                 </a:solidFill>
@@ -6173,7 +6169,7 @@
               <a:t>XYZCommand</a:t>
             </a:r>
             <a:r>
-              <a:rPr lang="en-US" sz="1050" dirty="0" smtClean="0">
+              <a:rPr lang="en-US" sz="1050" dirty="0">
                 <a:solidFill>
                   <a:schemeClr val="bg1"/>
                 </a:solidFill>
@@ -6181,7 +6177,7 @@
               <a:t> = </a:t>
             </a:r>
             <a:r>
-              <a:rPr lang="en-US" sz="1050" dirty="0" err="1" smtClean="0">
+              <a:rPr lang="en-US" sz="1050" dirty="0" err="1">
                 <a:solidFill>
                   <a:schemeClr val="bg1"/>
                 </a:solidFill>
@@ -6189,7 +6185,7 @@
               <a:t>AddCommand</a:t>
             </a:r>
             <a:r>
-              <a:rPr lang="en-US" sz="1050" dirty="0" smtClean="0">
+              <a:rPr lang="en-US" sz="1050" dirty="0">
                 <a:solidFill>
                   <a:schemeClr val="bg1"/>
                 </a:solidFill>
@@ -6197,7 +6193,7 @@
               <a:t>, </a:t>
             </a:r>
             <a:r>
-              <a:rPr lang="en-US" sz="1050" dirty="0" err="1" smtClean="0">
+              <a:rPr lang="en-US" sz="1050" dirty="0" err="1">
                 <a:solidFill>
                   <a:schemeClr val="bg1"/>
                 </a:solidFill>
@@ -6205,18 +6201,13 @@
               <a:t>FindCommand</a:t>
             </a:r>
             <a:r>
-              <a:rPr lang="en-US" sz="1050" dirty="0" smtClean="0">
+              <a:rPr lang="en-US" sz="1050" dirty="0">
                 <a:solidFill>
                   <a:schemeClr val="bg1"/>
                 </a:solidFill>
               </a:rPr>
               <a:t>, etc.</a:t>
             </a:r>
-            <a:endParaRPr lang="en-US" sz="1050" dirty="0">
-              <a:solidFill>
-                <a:schemeClr val="bg1"/>
-              </a:solidFill>
-            </a:endParaRPr>
           </a:p>
         </p:txBody>
       </p:sp>
@@ -6264,14 +6255,14 @@
           <a:p>
             <a:pPr algn="ctr"/>
             <a:r>
-              <a:rPr lang="en-US" sz="1050" dirty="0" err="1" smtClean="0">
+              <a:rPr lang="en-US" sz="1050" dirty="0" err="1">
                 <a:solidFill>
                   <a:schemeClr val="bg1"/>
                 </a:solidFill>
               </a:rPr>
               <a:t>UndoRedo</a:t>
             </a:r>
-            <a:endParaRPr lang="en-US" sz="1050" dirty="0" smtClean="0">
+            <a:endParaRPr lang="en-US" sz="1050" dirty="0">
               <a:solidFill>
                 <a:schemeClr val="bg1"/>
               </a:solidFill>
@@ -6280,7 +6271,7 @@
           <a:p>
             <a:pPr algn="ctr"/>
             <a:r>
-              <a:rPr lang="en-US" sz="1050" dirty="0" smtClean="0">
+              <a:rPr lang="en-US" sz="1050" dirty="0">
                 <a:solidFill>
                   <a:schemeClr val="bg1"/>
                 </a:solidFill>

</xml_diff>

<commit_message>
Update User Guide and Developer Guide (#102)
</commit_message>
<xml_diff>
--- a/docs/diagrams/LogicComponentClassDiagram.pptx
+++ b/docs/diagrams/LogicComponentClassDiagram.pptx
@@ -208,7 +208,7 @@
           <a:p>
             <a:fld id="{F5CC4B3F-88C1-4FFA-B1B6-F41C21DC6924}" type="datetimeFigureOut">
               <a:rPr lang="en-US" smtClean="0"/>
-              <a:t>3/13/2018</a:t>
+              <a:t>3/26/2018</a:t>
             </a:fld>
             <a:endParaRPr lang="en-US"/>
           </a:p>
@@ -654,7 +654,7 @@
           <a:p>
             <a:fld id="{78C97017-6FC3-485B-9764-EAC9E56C1D49}" type="datetimeFigureOut">
               <a:rPr lang="en-US" smtClean="0"/>
-              <a:t>3/13/2018</a:t>
+              <a:t>3/26/2018</a:t>
             </a:fld>
             <a:endParaRPr lang="en-US"/>
           </a:p>
@@ -822,7 +822,7 @@
           <a:p>
             <a:fld id="{78C97017-6FC3-485B-9764-EAC9E56C1D49}" type="datetimeFigureOut">
               <a:rPr lang="en-US" smtClean="0"/>
-              <a:t>3/13/2018</a:t>
+              <a:t>3/26/2018</a:t>
             </a:fld>
             <a:endParaRPr lang="en-US"/>
           </a:p>
@@ -1000,7 +1000,7 @@
           <a:p>
             <a:fld id="{78C97017-6FC3-485B-9764-EAC9E56C1D49}" type="datetimeFigureOut">
               <a:rPr lang="en-US" smtClean="0"/>
-              <a:t>3/13/2018</a:t>
+              <a:t>3/26/2018</a:t>
             </a:fld>
             <a:endParaRPr lang="en-US"/>
           </a:p>
@@ -1168,7 +1168,7 @@
           <a:p>
             <a:fld id="{78C97017-6FC3-485B-9764-EAC9E56C1D49}" type="datetimeFigureOut">
               <a:rPr lang="en-US" smtClean="0"/>
-              <a:t>3/13/2018</a:t>
+              <a:t>3/26/2018</a:t>
             </a:fld>
             <a:endParaRPr lang="en-US"/>
           </a:p>
@@ -1413,7 +1413,7 @@
           <a:p>
             <a:fld id="{78C97017-6FC3-485B-9764-EAC9E56C1D49}" type="datetimeFigureOut">
               <a:rPr lang="en-US" smtClean="0"/>
-              <a:t>3/13/2018</a:t>
+              <a:t>3/26/2018</a:t>
             </a:fld>
             <a:endParaRPr lang="en-US"/>
           </a:p>
@@ -1698,7 +1698,7 @@
           <a:p>
             <a:fld id="{78C97017-6FC3-485B-9764-EAC9E56C1D49}" type="datetimeFigureOut">
               <a:rPr lang="en-US" smtClean="0"/>
-              <a:t>3/13/2018</a:t>
+              <a:t>3/26/2018</a:t>
             </a:fld>
             <a:endParaRPr lang="en-US"/>
           </a:p>
@@ -2117,7 +2117,7 @@
           <a:p>
             <a:fld id="{78C97017-6FC3-485B-9764-EAC9E56C1D49}" type="datetimeFigureOut">
               <a:rPr lang="en-US" smtClean="0"/>
-              <a:t>3/13/2018</a:t>
+              <a:t>3/26/2018</a:t>
             </a:fld>
             <a:endParaRPr lang="en-US"/>
           </a:p>
@@ -2234,7 +2234,7 @@
           <a:p>
             <a:fld id="{78C97017-6FC3-485B-9764-EAC9E56C1D49}" type="datetimeFigureOut">
               <a:rPr lang="en-US" smtClean="0"/>
-              <a:t>3/13/2018</a:t>
+              <a:t>3/26/2018</a:t>
             </a:fld>
             <a:endParaRPr lang="en-US"/>
           </a:p>
@@ -2329,7 +2329,7 @@
           <a:p>
             <a:fld id="{78C97017-6FC3-485B-9764-EAC9E56C1D49}" type="datetimeFigureOut">
               <a:rPr lang="en-US" smtClean="0"/>
-              <a:t>3/13/2018</a:t>
+              <a:t>3/26/2018</a:t>
             </a:fld>
             <a:endParaRPr lang="en-US"/>
           </a:p>
@@ -2604,7 +2604,7 @@
           <a:p>
             <a:fld id="{78C97017-6FC3-485B-9764-EAC9E56C1D49}" type="datetimeFigureOut">
               <a:rPr lang="en-US" smtClean="0"/>
-              <a:t>3/13/2018</a:t>
+              <a:t>3/26/2018</a:t>
             </a:fld>
             <a:endParaRPr lang="en-US"/>
           </a:p>
@@ -2856,7 +2856,7 @@
           <a:p>
             <a:fld id="{78C97017-6FC3-485B-9764-EAC9E56C1D49}" type="datetimeFigureOut">
               <a:rPr lang="en-US" smtClean="0"/>
-              <a:t>3/13/2018</a:t>
+              <a:t>3/26/2018</a:t>
             </a:fld>
             <a:endParaRPr lang="en-US"/>
           </a:p>
@@ -3067,7 +3067,7 @@
           <a:p>
             <a:fld id="{78C97017-6FC3-485B-9764-EAC9E56C1D49}" type="datetimeFigureOut">
               <a:rPr lang="en-US" smtClean="0"/>
-              <a:t>3/13/2018</a:t>
+              <a:t>3/26/2018</a:t>
             </a:fld>
             <a:endParaRPr lang="en-US"/>
           </a:p>
@@ -6219,8 +6219,8 @@
         </p:nvSpPr>
         <p:spPr>
           <a:xfrm>
-            <a:off x="2334221" y="3058789"/>
-            <a:ext cx="758695" cy="346760"/>
+            <a:off x="2314687" y="3058789"/>
+            <a:ext cx="778229" cy="346760"/>
           </a:xfrm>
           <a:prstGeom prst="rect">
             <a:avLst/>
@@ -6260,23 +6260,7 @@
                   <a:schemeClr val="bg1"/>
                 </a:solidFill>
               </a:rPr>
-              <a:t>UndoRedo</a:t>
-            </a:r>
-            <a:endParaRPr lang="en-US" sz="1050" dirty="0">
-              <a:solidFill>
-                <a:schemeClr val="bg1"/>
-              </a:solidFill>
-            </a:endParaRPr>
-          </a:p>
-          <a:p>
-            <a:pPr algn="ctr"/>
-            <a:r>
-              <a:rPr lang="en-US" sz="1050" dirty="0">
-                <a:solidFill>
-                  <a:schemeClr val="bg1"/>
-                </a:solidFill>
-              </a:rPr>
-              <a:t>Stack</a:t>
+              <a:t>UndoStack</a:t>
             </a:r>
             <a:endParaRPr lang="en-SG" sz="1050" dirty="0">
               <a:solidFill>
@@ -6290,14 +6274,15 @@
         <p:nvCxnSpPr>
           <p:cNvPr id="61" name="Straight Arrow Connector 57"/>
           <p:cNvCxnSpPr>
+            <a:cxnSpLocks/>
             <a:endCxn id="59" idx="2"/>
           </p:cNvCxnSpPr>
           <p:nvPr/>
         </p:nvCxnSpPr>
         <p:spPr>
-          <a:xfrm flipV="1">
-            <a:off x="2713568" y="3405549"/>
-            <a:ext cx="1" cy="177981"/>
+          <a:xfrm flipH="1" flipV="1">
+            <a:off x="2703802" y="3405549"/>
+            <a:ext cx="9766" cy="177982"/>
           </a:xfrm>
           <a:prstGeom prst="straightConnector1">
             <a:avLst/>

</xml_diff>

<commit_message>
Make minor changes to Developer Guide (#204)
</commit_message>
<xml_diff>
--- a/docs/diagrams/LogicComponentClassDiagram.pptx
+++ b/docs/diagrams/LogicComponentClassDiagram.pptx
@@ -208,7 +208,7 @@
           <a:p>
             <a:fld id="{F5CC4B3F-88C1-4FFA-B1B6-F41C21DC6924}" type="datetimeFigureOut">
               <a:rPr lang="en-US" smtClean="0"/>
-              <a:t>3/29/2018</a:t>
+              <a:t>4/15/2018</a:t>
             </a:fld>
             <a:endParaRPr lang="en-US"/>
           </a:p>
@@ -654,7 +654,7 @@
           <a:p>
             <a:fld id="{78C97017-6FC3-485B-9764-EAC9E56C1D49}" type="datetimeFigureOut">
               <a:rPr lang="en-US" smtClean="0"/>
-              <a:t>3/29/2018</a:t>
+              <a:t>4/15/2018</a:t>
             </a:fld>
             <a:endParaRPr lang="en-US"/>
           </a:p>
@@ -822,7 +822,7 @@
           <a:p>
             <a:fld id="{78C97017-6FC3-485B-9764-EAC9E56C1D49}" type="datetimeFigureOut">
               <a:rPr lang="en-US" smtClean="0"/>
-              <a:t>3/29/2018</a:t>
+              <a:t>4/15/2018</a:t>
             </a:fld>
             <a:endParaRPr lang="en-US"/>
           </a:p>
@@ -1000,7 +1000,7 @@
           <a:p>
             <a:fld id="{78C97017-6FC3-485B-9764-EAC9E56C1D49}" type="datetimeFigureOut">
               <a:rPr lang="en-US" smtClean="0"/>
-              <a:t>3/29/2018</a:t>
+              <a:t>4/15/2018</a:t>
             </a:fld>
             <a:endParaRPr lang="en-US"/>
           </a:p>
@@ -1168,7 +1168,7 @@
           <a:p>
             <a:fld id="{78C97017-6FC3-485B-9764-EAC9E56C1D49}" type="datetimeFigureOut">
               <a:rPr lang="en-US" smtClean="0"/>
-              <a:t>3/29/2018</a:t>
+              <a:t>4/15/2018</a:t>
             </a:fld>
             <a:endParaRPr lang="en-US"/>
           </a:p>
@@ -1413,7 +1413,7 @@
           <a:p>
             <a:fld id="{78C97017-6FC3-485B-9764-EAC9E56C1D49}" type="datetimeFigureOut">
               <a:rPr lang="en-US" smtClean="0"/>
-              <a:t>3/29/2018</a:t>
+              <a:t>4/15/2018</a:t>
             </a:fld>
             <a:endParaRPr lang="en-US"/>
           </a:p>
@@ -1698,7 +1698,7 @@
           <a:p>
             <a:fld id="{78C97017-6FC3-485B-9764-EAC9E56C1D49}" type="datetimeFigureOut">
               <a:rPr lang="en-US" smtClean="0"/>
-              <a:t>3/29/2018</a:t>
+              <a:t>4/15/2018</a:t>
             </a:fld>
             <a:endParaRPr lang="en-US"/>
           </a:p>
@@ -2117,7 +2117,7 @@
           <a:p>
             <a:fld id="{78C97017-6FC3-485B-9764-EAC9E56C1D49}" type="datetimeFigureOut">
               <a:rPr lang="en-US" smtClean="0"/>
-              <a:t>3/29/2018</a:t>
+              <a:t>4/15/2018</a:t>
             </a:fld>
             <a:endParaRPr lang="en-US"/>
           </a:p>
@@ -2234,7 +2234,7 @@
           <a:p>
             <a:fld id="{78C97017-6FC3-485B-9764-EAC9E56C1D49}" type="datetimeFigureOut">
               <a:rPr lang="en-US" smtClean="0"/>
-              <a:t>3/29/2018</a:t>
+              <a:t>4/15/2018</a:t>
             </a:fld>
             <a:endParaRPr lang="en-US"/>
           </a:p>
@@ -2329,7 +2329,7 @@
           <a:p>
             <a:fld id="{78C97017-6FC3-485B-9764-EAC9E56C1D49}" type="datetimeFigureOut">
               <a:rPr lang="en-US" smtClean="0"/>
-              <a:t>3/29/2018</a:t>
+              <a:t>4/15/2018</a:t>
             </a:fld>
             <a:endParaRPr lang="en-US"/>
           </a:p>
@@ -2604,7 +2604,7 @@
           <a:p>
             <a:fld id="{78C97017-6FC3-485B-9764-EAC9E56C1D49}" type="datetimeFigureOut">
               <a:rPr lang="en-US" smtClean="0"/>
-              <a:t>3/29/2018</a:t>
+              <a:t>4/15/2018</a:t>
             </a:fld>
             <a:endParaRPr lang="en-US"/>
           </a:p>
@@ -2856,7 +2856,7 @@
           <a:p>
             <a:fld id="{78C97017-6FC3-485B-9764-EAC9E56C1D49}" type="datetimeFigureOut">
               <a:rPr lang="en-US" smtClean="0"/>
-              <a:t>3/29/2018</a:t>
+              <a:t>4/15/2018</a:t>
             </a:fld>
             <a:endParaRPr lang="en-US"/>
           </a:p>
@@ -3067,7 +3067,7 @@
           <a:p>
             <a:fld id="{78C97017-6FC3-485B-9764-EAC9E56C1D49}" type="datetimeFigureOut">
               <a:rPr lang="en-US" smtClean="0"/>
-              <a:t>3/29/2018</a:t>
+              <a:t>4/15/2018</a:t>
             </a:fld>
             <a:endParaRPr lang="en-US"/>
           </a:p>
@@ -3451,7 +3451,7 @@
         <p:spPr>
           <a:xfrm>
             <a:off x="1066800" y="914399"/>
-            <a:ext cx="7084740" cy="3762375"/>
+            <a:ext cx="7084740" cy="4035741"/>
           </a:xfrm>
           <a:prstGeom prst="roundRect">
             <a:avLst>
@@ -3689,7 +3689,7 @@
         <p:spPr>
           <a:xfrm flipH="1" flipV="1">
             <a:off x="3189583" y="1426447"/>
-            <a:ext cx="4559332" cy="2895973"/>
+            <a:ext cx="4559332" cy="3090333"/>
           </a:xfrm>
           <a:prstGeom prst="bentConnector3">
             <a:avLst>
@@ -3772,7 +3772,7 @@
         </p:nvSpPr>
         <p:spPr>
           <a:xfrm>
-            <a:off x="1143000" y="4777355"/>
+            <a:off x="1143000" y="5082155"/>
             <a:ext cx="3371850" cy="328045"/>
           </a:xfrm>
           <a:prstGeom prst="roundRect">
@@ -3832,7 +3832,7 @@
         </p:nvSpPr>
         <p:spPr>
           <a:xfrm>
-            <a:off x="6976872" y="4149040"/>
+            <a:off x="6976872" y="4343400"/>
             <a:ext cx="772043" cy="346760"/>
           </a:xfrm>
           <a:prstGeom prst="rect">
@@ -3969,13 +3969,15 @@
       <p:cxnSp>
         <p:nvCxnSpPr>
           <p:cNvPr id="18" name="Straight Arrow Connector 110"/>
-          <p:cNvCxnSpPr/>
+          <p:cNvCxnSpPr>
+            <a:cxnSpLocks/>
+          </p:cNvCxnSpPr>
           <p:nvPr/>
         </p:nvCxnSpPr>
         <p:spPr>
           <a:xfrm>
-            <a:off x="7543800" y="4495800"/>
-            <a:ext cx="0" cy="281555"/>
+            <a:off x="7543800" y="4690160"/>
+            <a:ext cx="0" cy="405513"/>
           </a:xfrm>
           <a:prstGeom prst="straightConnector1">
             <a:avLst/>
@@ -4175,6 +4177,7 @@
         <p:nvCxnSpPr>
           <p:cNvPr id="23" name="Straight Arrow Connector 57"/>
           <p:cNvCxnSpPr>
+            <a:cxnSpLocks/>
             <a:stCxn id="5" idx="2"/>
           </p:cNvCxnSpPr>
           <p:nvPr/>
@@ -4182,7 +4185,7 @@
         <p:spPr>
           <a:xfrm>
             <a:off x="2329313" y="3930290"/>
-            <a:ext cx="1376" cy="854841"/>
+            <a:ext cx="0" cy="1151865"/>
           </a:xfrm>
           <a:prstGeom prst="straightConnector1">
             <a:avLst/>
@@ -4258,18 +4261,19 @@
         <p:nvCxnSpPr>
           <p:cNvPr id="25" name="Elbow Connector 63"/>
           <p:cNvCxnSpPr>
+            <a:cxnSpLocks/>
             <a:endCxn id="12" idx="1"/>
           </p:cNvCxnSpPr>
           <p:nvPr/>
         </p:nvCxnSpPr>
         <p:spPr>
           <a:xfrm>
-            <a:off x="2281833" y="3939492"/>
-            <a:ext cx="4695039" cy="382928"/>
+            <a:off x="2425983" y="3963467"/>
+            <a:ext cx="4550889" cy="553313"/>
           </a:xfrm>
           <a:prstGeom prst="bentConnector3">
             <a:avLst>
-              <a:gd name="adj1" fmla="val -81"/>
+              <a:gd name="adj1" fmla="val 103"/>
             </a:avLst>
           </a:prstGeom>
           <a:ln w="19050">
@@ -5056,7 +5060,7 @@
         </p:nvSpPr>
         <p:spPr>
           <a:xfrm flipV="1">
-            <a:off x="7227643" y="3980475"/>
+            <a:off x="7227643" y="4167877"/>
             <a:ext cx="270504" cy="175523"/>
           </a:xfrm>
           <a:prstGeom prst="triangle">
@@ -5113,8 +5117,8 @@
         </p:nvCxnSpPr>
         <p:spPr>
           <a:xfrm rot="5400000" flipH="1" flipV="1">
-            <a:off x="6916385" y="3533423"/>
-            <a:ext cx="893563" cy="542"/>
+            <a:off x="6822684" y="3627124"/>
+            <a:ext cx="1080965" cy="542"/>
           </a:xfrm>
           <a:prstGeom prst="bentConnector3">
             <a:avLst>
@@ -5367,7 +5371,7 @@
         </p:nvSpPr>
         <p:spPr>
           <a:xfrm>
-            <a:off x="1295065" y="4183424"/>
+            <a:off x="1168036" y="4014939"/>
             <a:ext cx="805984" cy="346760"/>
           </a:xfrm>
           <a:prstGeom prst="rect">
@@ -5429,44 +5433,6 @@
           </a:p>
         </p:txBody>
       </p:sp>
-      <p:cxnSp>
-        <p:nvCxnSpPr>
-          <p:cNvPr id="88" name="Straight Arrow Connector 57"/>
-          <p:cNvCxnSpPr/>
-          <p:nvPr/>
-        </p:nvCxnSpPr>
-        <p:spPr>
-          <a:xfrm>
-            <a:off x="1971157" y="3939492"/>
-            <a:ext cx="2022" cy="240622"/>
-          </a:xfrm>
-          <a:prstGeom prst="straightConnector1">
-            <a:avLst/>
-          </a:prstGeom>
-          <a:ln w="19050">
-            <a:solidFill>
-              <a:srgbClr val="0070C0"/>
-            </a:solidFill>
-            <a:headEnd type="none" w="med" len="med"/>
-            <a:tailEnd type="arrow" w="med" len="med"/>
-          </a:ln>
-          <a:effectLst/>
-        </p:spPr>
-        <p:style>
-          <a:lnRef idx="1">
-            <a:schemeClr val="accent2"/>
-          </a:lnRef>
-          <a:fillRef idx="2">
-            <a:schemeClr val="accent2"/>
-          </a:fillRef>
-          <a:effectRef idx="1">
-            <a:schemeClr val="accent2"/>
-          </a:effectRef>
-          <a:fontRef idx="minor">
-            <a:schemeClr val="dk1"/>
-          </a:fontRef>
-        </p:style>
-      </p:cxnSp>
       <p:sp>
         <p:nvSpPr>
           <p:cNvPr id="91" name="TextBox 90"/>
@@ -5475,7 +5441,7 @@
         </p:nvSpPr>
         <p:spPr>
           <a:xfrm>
-            <a:off x="1773980" y="4000395"/>
+            <a:off x="1385807" y="3832860"/>
             <a:ext cx="131116" cy="230832"/>
           </a:xfrm>
           <a:prstGeom prst="rect">
@@ -6356,7 +6322,7 @@
         </p:nvSpPr>
         <p:spPr>
           <a:xfrm>
-            <a:off x="4648200" y="4786036"/>
+            <a:off x="4648200" y="5082155"/>
             <a:ext cx="3381375" cy="328045"/>
           </a:xfrm>
           <a:prstGeom prst="roundRect">
@@ -6393,7 +6359,7 @@
           <a:p>
             <a:pPr algn="ctr"/>
             <a:r>
-              <a:rPr lang="en-US" sz="1100" b="1" smtClean="0">
+              <a:rPr lang="en-US" sz="1100" b="1">
                 <a:solidFill>
                   <a:schemeClr val="bg1"/>
                 </a:solidFill>
@@ -6411,17 +6377,21 @@
       <p:cxnSp>
         <p:nvCxnSpPr>
           <p:cNvPr id="65" name="Straight Arrow Connector 57"/>
-          <p:cNvCxnSpPr/>
+          <p:cNvCxnSpPr>
+            <a:cxnSpLocks/>
+            <a:stCxn id="5" idx="2"/>
+            <a:endCxn id="64" idx="0"/>
+          </p:cNvCxnSpPr>
           <p:nvPr/>
         </p:nvCxnSpPr>
         <p:spPr>
           <a:xfrm rot="16200000" flipH="1">
-            <a:off x="3338516" y="3095352"/>
-            <a:ext cx="855746" cy="2525622"/>
+            <a:off x="3758168" y="2501434"/>
+            <a:ext cx="1151865" cy="4009575"/>
           </a:xfrm>
           <a:prstGeom prst="bentConnector3">
             <a:avLst>
-              <a:gd name="adj1" fmla="val 72261"/>
+              <a:gd name="adj1" fmla="val 71169"/>
             </a:avLst>
           </a:prstGeom>
           <a:ln w="19050">
@@ -6451,17 +6421,21 @@
       <p:cxnSp>
         <p:nvCxnSpPr>
           <p:cNvPr id="74" name="Straight Arrow Connector 110"/>
-          <p:cNvCxnSpPr/>
+          <p:cNvCxnSpPr>
+            <a:cxnSpLocks/>
+            <a:stCxn id="12" idx="2"/>
+            <a:endCxn id="9" idx="0"/>
+          </p:cNvCxnSpPr>
           <p:nvPr/>
         </p:nvCxnSpPr>
         <p:spPr>
           <a:xfrm rot="5400000">
-            <a:off x="5574257" y="3036343"/>
-            <a:ext cx="281555" cy="3200469"/>
+            <a:off x="4899913" y="2619173"/>
+            <a:ext cx="391995" cy="4533969"/>
           </a:xfrm>
           <a:prstGeom prst="bentConnector3">
             <a:avLst>
-              <a:gd name="adj1" fmla="val 43234"/>
+              <a:gd name="adj1" fmla="val 50000"/>
             </a:avLst>
           </a:prstGeom>
           <a:ln w="19050">
@@ -6489,6 +6463,578 @@
           </a:fontRef>
         </p:style>
       </p:cxnSp>
+      <p:sp>
+        <p:nvSpPr>
+          <p:cNvPr id="82" name="Rectangle 62">
+            <a:extLst>
+              <a:ext uri="{FF2B5EF4-FFF2-40B4-BE49-F238E27FC236}">
+                <a16:creationId xmlns:a16="http://schemas.microsoft.com/office/drawing/2014/main" id="{C91B63C2-026C-4F32-AA6F-B9A503C4E707}"/>
+              </a:ext>
+            </a:extLst>
+          </p:cNvPr>
+          <p:cNvSpPr/>
+          <p:nvPr/>
+        </p:nvSpPr>
+        <p:spPr>
+          <a:xfrm>
+            <a:off x="3255419" y="4019275"/>
+            <a:ext cx="1046940" cy="346760"/>
+          </a:xfrm>
+          <a:prstGeom prst="rect">
+            <a:avLst/>
+          </a:prstGeom>
+          <a:solidFill>
+            <a:srgbClr val="0070C0"/>
+          </a:solidFill>
+          <a:ln w="19050">
+            <a:solidFill>
+              <a:srgbClr val="0070C0"/>
+            </a:solidFill>
+          </a:ln>
+          <a:effectLst/>
+        </p:spPr>
+        <p:style>
+          <a:lnRef idx="1">
+            <a:schemeClr val="accent2"/>
+          </a:lnRef>
+          <a:fillRef idx="2">
+            <a:schemeClr val="accent2"/>
+          </a:fillRef>
+          <a:effectRef idx="1">
+            <a:schemeClr val="accent2"/>
+          </a:effectRef>
+          <a:fontRef idx="minor">
+            <a:schemeClr val="dk1"/>
+          </a:fontRef>
+        </p:style>
+        <p:txBody>
+          <a:bodyPr rtlCol="0" anchor="ctr"/>
+          <a:lstStyle/>
+          <a:p>
+            <a:pPr algn="ctr"/>
+            <a:r>
+              <a:rPr lang="en-US" sz="1050" dirty="0">
+                <a:solidFill>
+                  <a:schemeClr val="bg1"/>
+                </a:solidFill>
+              </a:rPr>
+              <a:t>&lt;&lt;singleton&gt;&gt;</a:t>
+            </a:r>
+          </a:p>
+          <a:p>
+            <a:pPr algn="ctr"/>
+            <a:r>
+              <a:rPr lang="en-US" sz="1050" dirty="0" err="1">
+                <a:solidFill>
+                  <a:schemeClr val="bg1"/>
+                </a:solidFill>
+              </a:rPr>
+              <a:t>LockManager</a:t>
+            </a:r>
+            <a:endParaRPr lang="en-SG" sz="1050" dirty="0">
+              <a:solidFill>
+                <a:schemeClr val="bg1"/>
+              </a:solidFill>
+            </a:endParaRPr>
+          </a:p>
+        </p:txBody>
+      </p:sp>
+      <p:sp>
+        <p:nvSpPr>
+          <p:cNvPr id="84" name="Rectangle 62">
+            <a:extLst>
+              <a:ext uri="{FF2B5EF4-FFF2-40B4-BE49-F238E27FC236}">
+                <a16:creationId xmlns:a16="http://schemas.microsoft.com/office/drawing/2014/main" id="{FDA09D85-6035-4250-9729-945B343A910A}"/>
+              </a:ext>
+            </a:extLst>
+          </p:cNvPr>
+          <p:cNvSpPr/>
+          <p:nvPr/>
+        </p:nvSpPr>
+        <p:spPr>
+          <a:xfrm>
+            <a:off x="1156183" y="4493714"/>
+            <a:ext cx="1040434" cy="346760"/>
+          </a:xfrm>
+          <a:prstGeom prst="rect">
+            <a:avLst/>
+          </a:prstGeom>
+          <a:solidFill>
+            <a:srgbClr val="0070C0"/>
+          </a:solidFill>
+          <a:ln w="19050">
+            <a:solidFill>
+              <a:srgbClr val="0070C0"/>
+            </a:solidFill>
+          </a:ln>
+          <a:effectLst/>
+        </p:spPr>
+        <p:style>
+          <a:lnRef idx="1">
+            <a:schemeClr val="accent2"/>
+          </a:lnRef>
+          <a:fillRef idx="2">
+            <a:schemeClr val="accent2"/>
+          </a:fillRef>
+          <a:effectRef idx="1">
+            <a:schemeClr val="accent2"/>
+          </a:effectRef>
+          <a:fontRef idx="minor">
+            <a:schemeClr val="dk1"/>
+          </a:fontRef>
+        </p:style>
+        <p:txBody>
+          <a:bodyPr rtlCol="0" anchor="ctr"/>
+          <a:lstStyle/>
+          <a:p>
+            <a:pPr algn="ctr"/>
+            <a:r>
+              <a:rPr lang="en-US" sz="1050" dirty="0" err="1">
+                <a:solidFill>
+                  <a:schemeClr val="bg1"/>
+                </a:solidFill>
+              </a:rPr>
+              <a:t>CommandAutocorrection</a:t>
+            </a:r>
+            <a:endParaRPr lang="en-SG" sz="1050" dirty="0">
+              <a:solidFill>
+                <a:schemeClr val="bg1"/>
+              </a:solidFill>
+            </a:endParaRPr>
+          </a:p>
+        </p:txBody>
+      </p:sp>
+      <p:cxnSp>
+        <p:nvCxnSpPr>
+          <p:cNvPr id="90" name="Straight Arrow Connector 57">
+            <a:extLst>
+              <a:ext uri="{FF2B5EF4-FFF2-40B4-BE49-F238E27FC236}">
+                <a16:creationId xmlns:a16="http://schemas.microsoft.com/office/drawing/2014/main" id="{98E20D30-25A9-4BB8-B755-448A962D046C}"/>
+              </a:ext>
+            </a:extLst>
+          </p:cNvPr>
+          <p:cNvCxnSpPr>
+            <a:cxnSpLocks/>
+            <a:endCxn id="86" idx="0"/>
+          </p:cNvCxnSpPr>
+          <p:nvPr/>
+        </p:nvCxnSpPr>
+        <p:spPr>
+          <a:xfrm rot="10800000" flipV="1">
+            <a:off x="1571029" y="3862551"/>
+            <a:ext cx="288027" cy="152388"/>
+          </a:xfrm>
+          <a:prstGeom prst="bentConnector2">
+            <a:avLst/>
+          </a:prstGeom>
+          <a:ln w="19050">
+            <a:solidFill>
+              <a:srgbClr val="0070C0"/>
+            </a:solidFill>
+            <a:headEnd type="none" w="med" len="med"/>
+            <a:tailEnd type="arrow" w="med" len="med"/>
+          </a:ln>
+          <a:effectLst/>
+        </p:spPr>
+        <p:style>
+          <a:lnRef idx="1">
+            <a:schemeClr val="accent2"/>
+          </a:lnRef>
+          <a:fillRef idx="2">
+            <a:schemeClr val="accent2"/>
+          </a:fillRef>
+          <a:effectRef idx="1">
+            <a:schemeClr val="accent2"/>
+          </a:effectRef>
+          <a:fontRef idx="minor">
+            <a:schemeClr val="dk1"/>
+          </a:fontRef>
+        </p:style>
+      </p:cxnSp>
+      <p:cxnSp>
+        <p:nvCxnSpPr>
+          <p:cNvPr id="98" name="Elbow Connector 122">
+            <a:extLst>
+              <a:ext uri="{FF2B5EF4-FFF2-40B4-BE49-F238E27FC236}">
+                <a16:creationId xmlns:a16="http://schemas.microsoft.com/office/drawing/2014/main" id="{C4841401-D4A5-4E34-9B9E-795D043761F8}"/>
+              </a:ext>
+            </a:extLst>
+          </p:cNvPr>
+          <p:cNvCxnSpPr>
+            <a:cxnSpLocks/>
+          </p:cNvCxnSpPr>
+          <p:nvPr/>
+        </p:nvCxnSpPr>
+        <p:spPr>
+          <a:xfrm rot="16200000" flipH="1">
+            <a:off x="1825730" y="4223854"/>
+            <a:ext cx="538316" cy="1407"/>
+          </a:xfrm>
+          <a:prstGeom prst="bentConnector3">
+            <a:avLst>
+              <a:gd name="adj1" fmla="val 50000"/>
+            </a:avLst>
+          </a:prstGeom>
+          <a:ln w="19050">
+            <a:solidFill>
+              <a:srgbClr val="0070C0"/>
+            </a:solidFill>
+            <a:prstDash val="sysDot"/>
+            <a:headEnd type="none" w="med" len="med"/>
+            <a:tailEnd type="arrow" w="med" len="med"/>
+          </a:ln>
+          <a:effectLst/>
+        </p:spPr>
+        <p:style>
+          <a:lnRef idx="1">
+            <a:schemeClr val="accent2"/>
+          </a:lnRef>
+          <a:fillRef idx="2">
+            <a:schemeClr val="accent2"/>
+          </a:fillRef>
+          <a:effectRef idx="1">
+            <a:schemeClr val="accent2"/>
+          </a:effectRef>
+          <a:fontRef idx="minor">
+            <a:schemeClr val="dk1"/>
+          </a:fontRef>
+        </p:style>
+      </p:cxnSp>
+      <p:cxnSp>
+        <p:nvCxnSpPr>
+          <p:cNvPr id="105" name="Elbow Connector 63">
+            <a:extLst>
+              <a:ext uri="{FF2B5EF4-FFF2-40B4-BE49-F238E27FC236}">
+                <a16:creationId xmlns:a16="http://schemas.microsoft.com/office/drawing/2014/main" id="{B9B8CF69-C762-41B1-96B8-3DD94639A24D}"/>
+              </a:ext>
+            </a:extLst>
+          </p:cNvPr>
+          <p:cNvCxnSpPr>
+            <a:cxnSpLocks/>
+            <a:endCxn id="82" idx="1"/>
+          </p:cNvCxnSpPr>
+          <p:nvPr/>
+        </p:nvCxnSpPr>
+        <p:spPr>
+          <a:xfrm>
+            <a:off x="2601617" y="3917408"/>
+            <a:ext cx="653802" cy="275247"/>
+          </a:xfrm>
+          <a:prstGeom prst="bentConnector3">
+            <a:avLst>
+              <a:gd name="adj1" fmla="val -2447"/>
+            </a:avLst>
+          </a:prstGeom>
+          <a:ln w="19050">
+            <a:solidFill>
+              <a:srgbClr val="0070C0"/>
+            </a:solidFill>
+            <a:prstDash val="sysDot"/>
+            <a:headEnd type="none" w="med" len="med"/>
+            <a:tailEnd type="arrow" w="med" len="med"/>
+          </a:ln>
+          <a:effectLst/>
+        </p:spPr>
+        <p:style>
+          <a:lnRef idx="1">
+            <a:schemeClr val="accent2"/>
+          </a:lnRef>
+          <a:fillRef idx="2">
+            <a:schemeClr val="accent2"/>
+          </a:fillRef>
+          <a:effectRef idx="1">
+            <a:schemeClr val="accent2"/>
+          </a:effectRef>
+          <a:fontRef idx="minor">
+            <a:schemeClr val="dk1"/>
+          </a:fontRef>
+        </p:style>
+      </p:cxnSp>
+      <p:cxnSp>
+        <p:nvCxnSpPr>
+          <p:cNvPr id="107" name="Elbow Connector 63">
+            <a:extLst>
+              <a:ext uri="{FF2B5EF4-FFF2-40B4-BE49-F238E27FC236}">
+                <a16:creationId xmlns:a16="http://schemas.microsoft.com/office/drawing/2014/main" id="{FF10DE46-9914-4867-A877-4FC6BC01624E}"/>
+              </a:ext>
+            </a:extLst>
+          </p:cNvPr>
+          <p:cNvCxnSpPr>
+            <a:cxnSpLocks/>
+            <a:endCxn id="82" idx="3"/>
+          </p:cNvCxnSpPr>
+          <p:nvPr/>
+        </p:nvCxnSpPr>
+        <p:spPr>
+          <a:xfrm rot="10800000" flipV="1">
+            <a:off x="4302359" y="3084571"/>
+            <a:ext cx="2692354" cy="1108083"/>
+          </a:xfrm>
+          <a:prstGeom prst="bentConnector3">
+            <a:avLst>
+              <a:gd name="adj1" fmla="val -378"/>
+            </a:avLst>
+          </a:prstGeom>
+          <a:ln w="19050">
+            <a:solidFill>
+              <a:srgbClr val="0070C0"/>
+            </a:solidFill>
+            <a:prstDash val="sysDot"/>
+            <a:headEnd type="none" w="med" len="med"/>
+            <a:tailEnd type="arrow" w="med" len="med"/>
+          </a:ln>
+          <a:effectLst/>
+        </p:spPr>
+        <p:style>
+          <a:lnRef idx="1">
+            <a:schemeClr val="accent2"/>
+          </a:lnRef>
+          <a:fillRef idx="2">
+            <a:schemeClr val="accent2"/>
+          </a:fillRef>
+          <a:effectRef idx="1">
+            <a:schemeClr val="accent2"/>
+          </a:effectRef>
+          <a:fontRef idx="minor">
+            <a:schemeClr val="dk1"/>
+          </a:fontRef>
+        </p:style>
+      </p:cxnSp>
+      <p:grpSp>
+        <p:nvGrpSpPr>
+          <p:cNvPr id="113" name="Group 112">
+            <a:extLst>
+              <a:ext uri="{FF2B5EF4-FFF2-40B4-BE49-F238E27FC236}">
+                <a16:creationId xmlns:a16="http://schemas.microsoft.com/office/drawing/2014/main" id="{C63167CD-1771-45B8-A92B-9F546517A0FF}"/>
+              </a:ext>
+            </a:extLst>
+          </p:cNvPr>
+          <p:cNvGrpSpPr/>
+          <p:nvPr/>
+        </p:nvGrpSpPr>
+        <p:grpSpPr>
+          <a:xfrm>
+            <a:off x="5566977" y="4008469"/>
+            <a:ext cx="868568" cy="230832"/>
+            <a:chOff x="2755838" y="789460"/>
+            <a:chExt cx="868568" cy="230832"/>
+          </a:xfrm>
+        </p:grpSpPr>
+        <p:sp>
+          <p:nvSpPr>
+            <p:cNvPr id="114" name="TextBox 113">
+              <a:extLst>
+                <a:ext uri="{FF2B5EF4-FFF2-40B4-BE49-F238E27FC236}">
+                  <a16:creationId xmlns:a16="http://schemas.microsoft.com/office/drawing/2014/main" id="{157A9E88-4F46-4854-BD8F-AEE7A39606CB}"/>
+                </a:ext>
+              </a:extLst>
+            </p:cNvPr>
+            <p:cNvSpPr txBox="1"/>
+            <p:nvPr/>
+          </p:nvSpPr>
+          <p:spPr>
+            <a:xfrm>
+              <a:off x="2895600" y="789460"/>
+              <a:ext cx="728806" cy="230832"/>
+            </a:xfrm>
+            <a:prstGeom prst="rect">
+              <a:avLst/>
+            </a:prstGeom>
+            <a:noFill/>
+          </p:spPr>
+          <p:txBody>
+            <a:bodyPr wrap="square" lIns="0" tIns="0" rIns="0" bIns="0" rtlCol="0">
+              <a:noAutofit/>
+            </a:bodyPr>
+            <a:lstStyle/>
+            <a:p>
+              <a:r>
+                <a:rPr lang="en-US" sz="1100" dirty="0">
+                  <a:solidFill>
+                    <a:srgbClr val="0070C0"/>
+                  </a:solidFill>
+                </a:rPr>
+                <a:t>uses</a:t>
+              </a:r>
+              <a:endParaRPr lang="en-SG" sz="1100" dirty="0">
+                <a:solidFill>
+                  <a:srgbClr val="0070C0"/>
+                </a:solidFill>
+              </a:endParaRPr>
+            </a:p>
+          </p:txBody>
+        </p:sp>
+        <p:sp>
+          <p:nvSpPr>
+            <p:cNvPr id="115" name="Isosceles Triangle 114">
+              <a:extLst>
+                <a:ext uri="{FF2B5EF4-FFF2-40B4-BE49-F238E27FC236}">
+                  <a16:creationId xmlns:a16="http://schemas.microsoft.com/office/drawing/2014/main" id="{3722DB4E-7290-4B1A-B510-F1E34A22B8D2}"/>
+                </a:ext>
+              </a:extLst>
+            </p:cNvPr>
+            <p:cNvSpPr/>
+            <p:nvPr/>
+          </p:nvSpPr>
+          <p:spPr>
+            <a:xfrm rot="16200000" flipH="1">
+              <a:off x="2730963" y="857181"/>
+              <a:ext cx="125951" cy="76201"/>
+            </a:xfrm>
+            <a:prstGeom prst="triangle">
+              <a:avLst/>
+            </a:prstGeom>
+            <a:solidFill>
+              <a:srgbClr val="0070C0"/>
+            </a:solidFill>
+            <a:ln>
+              <a:noFill/>
+            </a:ln>
+          </p:spPr>
+          <p:style>
+            <a:lnRef idx="2">
+              <a:schemeClr val="accent1">
+                <a:shade val="50000"/>
+              </a:schemeClr>
+            </a:lnRef>
+            <a:fillRef idx="1">
+              <a:schemeClr val="accent1"/>
+            </a:fillRef>
+            <a:effectRef idx="0">
+              <a:schemeClr val="accent1"/>
+            </a:effectRef>
+            <a:fontRef idx="minor">
+              <a:schemeClr val="lt1"/>
+            </a:fontRef>
+          </p:style>
+          <p:txBody>
+            <a:bodyPr rtlCol="0" anchor="ctr"/>
+            <a:lstStyle/>
+            <a:p>
+              <a:pPr algn="ctr"/>
+              <a:endParaRPr lang="en-SG"/>
+            </a:p>
+          </p:txBody>
+        </p:sp>
+      </p:grpSp>
+      <p:grpSp>
+        <p:nvGrpSpPr>
+          <p:cNvPr id="116" name="Group 115">
+            <a:extLst>
+              <a:ext uri="{FF2B5EF4-FFF2-40B4-BE49-F238E27FC236}">
+                <a16:creationId xmlns:a16="http://schemas.microsoft.com/office/drawing/2014/main" id="{0E89144A-FE43-424B-B8B5-6430FA32F928}"/>
+              </a:ext>
+            </a:extLst>
+          </p:cNvPr>
+          <p:cNvGrpSpPr/>
+          <p:nvPr/>
+        </p:nvGrpSpPr>
+        <p:grpSpPr>
+          <a:xfrm>
+            <a:off x="2204814" y="4005436"/>
+            <a:ext cx="889000" cy="230832"/>
+            <a:chOff x="2895600" y="807932"/>
+            <a:chExt cx="889000" cy="230832"/>
+          </a:xfrm>
+        </p:grpSpPr>
+        <p:sp>
+          <p:nvSpPr>
+            <p:cNvPr id="117" name="TextBox 116">
+              <a:extLst>
+                <a:ext uri="{FF2B5EF4-FFF2-40B4-BE49-F238E27FC236}">
+                  <a16:creationId xmlns:a16="http://schemas.microsoft.com/office/drawing/2014/main" id="{5BCC75E1-80F3-4E09-95F2-DC71F7342D07}"/>
+                </a:ext>
+              </a:extLst>
+            </p:cNvPr>
+            <p:cNvSpPr txBox="1"/>
+            <p:nvPr/>
+          </p:nvSpPr>
+          <p:spPr>
+            <a:xfrm>
+              <a:off x="2895600" y="807932"/>
+              <a:ext cx="728806" cy="230832"/>
+            </a:xfrm>
+            <a:prstGeom prst="rect">
+              <a:avLst/>
+            </a:prstGeom>
+            <a:noFill/>
+          </p:spPr>
+          <p:txBody>
+            <a:bodyPr wrap="square" lIns="0" tIns="0" rIns="0" bIns="0" rtlCol="0">
+              <a:noAutofit/>
+            </a:bodyPr>
+            <a:lstStyle/>
+            <a:p>
+              <a:pPr algn="r"/>
+              <a:r>
+                <a:rPr lang="en-US" sz="1100" dirty="0">
+                  <a:solidFill>
+                    <a:srgbClr val="0070C0"/>
+                  </a:solidFill>
+                </a:rPr>
+                <a:t>uses</a:t>
+              </a:r>
+              <a:endParaRPr lang="en-SG" sz="1100" dirty="0">
+                <a:solidFill>
+                  <a:srgbClr val="0070C0"/>
+                </a:solidFill>
+              </a:endParaRPr>
+            </a:p>
+          </p:txBody>
+        </p:sp>
+        <p:sp>
+          <p:nvSpPr>
+            <p:cNvPr id="119" name="Isosceles Triangle 118">
+              <a:extLst>
+                <a:ext uri="{FF2B5EF4-FFF2-40B4-BE49-F238E27FC236}">
+                  <a16:creationId xmlns:a16="http://schemas.microsoft.com/office/drawing/2014/main" id="{DFB867D6-1BDD-4C9C-942E-35E5136B905F}"/>
+                </a:ext>
+              </a:extLst>
+            </p:cNvPr>
+            <p:cNvSpPr/>
+            <p:nvPr/>
+          </p:nvSpPr>
+          <p:spPr>
+            <a:xfrm rot="5400000">
+              <a:off x="3683524" y="866776"/>
+              <a:ext cx="125951" cy="76201"/>
+            </a:xfrm>
+            <a:prstGeom prst="triangle">
+              <a:avLst/>
+            </a:prstGeom>
+            <a:solidFill>
+              <a:srgbClr val="0070C0"/>
+            </a:solidFill>
+            <a:ln>
+              <a:noFill/>
+            </a:ln>
+          </p:spPr>
+          <p:style>
+            <a:lnRef idx="2">
+              <a:schemeClr val="accent1">
+                <a:shade val="50000"/>
+              </a:schemeClr>
+            </a:lnRef>
+            <a:fillRef idx="1">
+              <a:schemeClr val="accent1"/>
+            </a:fillRef>
+            <a:effectRef idx="0">
+              <a:schemeClr val="accent1"/>
+            </a:effectRef>
+            <a:fontRef idx="minor">
+              <a:schemeClr val="lt1"/>
+            </a:fontRef>
+          </p:style>
+          <p:txBody>
+            <a:bodyPr rtlCol="0" anchor="ctr"/>
+            <a:lstStyle/>
+            <a:p>
+              <a:pPr algn="ctr"/>
+              <a:endParaRPr lang="en-SG"/>
+            </a:p>
+          </p:txBody>
+        </p:sp>
+      </p:grpSp>
     </p:spTree>
     <p:extLst>
       <p:ext uri="{BB962C8B-B14F-4D97-AF65-F5344CB8AC3E}">

</xml_diff>

<commit_message>
Updated Developer Guide and Diagrams and pptx Files
</commit_message>
<xml_diff>
--- a/docs/diagrams/LogicComponentClassDiagram.pptx
+++ b/docs/diagrams/LogicComponentClassDiagram.pptx
@@ -126,10 +126,6 @@
 </p:presentation>
 </file>
 
-<file path=ppt/revisionInfo.xml><?xml version="1.0" encoding="utf-8"?>
-<p1510:revInfo xmlns:a="http://schemas.openxmlformats.org/drawingml/2006/main" xmlns:r="http://schemas.openxmlformats.org/officeDocument/2006/relationships" xmlns:p1510="http://schemas.microsoft.com/office/powerpoint/2015/10/main"/>
-</file>
-
 <file path=ppt/notesMasters/notesMaster1.xml><?xml version="1.0" encoding="utf-8"?>
 <p:notesMaster xmlns:a="http://schemas.openxmlformats.org/drawingml/2006/main" xmlns:r="http://schemas.openxmlformats.org/officeDocument/2006/relationships" xmlns:p="http://schemas.openxmlformats.org/presentationml/2006/main">
   <p:cSld>
@@ -212,7 +208,7 @@
           <a:p>
             <a:fld id="{F5CC4B3F-88C1-4FFA-B1B6-F41C21DC6924}" type="datetimeFigureOut">
               <a:rPr lang="en-US" smtClean="0"/>
-              <a:t>7/20/17</a:t>
+              <a:t>4/15/2018</a:t>
             </a:fld>
             <a:endParaRPr lang="en-US"/>
           </a:p>
@@ -658,7 +654,7 @@
           <a:p>
             <a:fld id="{78C97017-6FC3-485B-9764-EAC9E56C1D49}" type="datetimeFigureOut">
               <a:rPr lang="en-US" smtClean="0"/>
-              <a:t>7/20/17</a:t>
+              <a:t>4/15/2018</a:t>
             </a:fld>
             <a:endParaRPr lang="en-US"/>
           </a:p>
@@ -826,7 +822,7 @@
           <a:p>
             <a:fld id="{78C97017-6FC3-485B-9764-EAC9E56C1D49}" type="datetimeFigureOut">
               <a:rPr lang="en-US" smtClean="0"/>
-              <a:t>7/20/17</a:t>
+              <a:t>4/15/2018</a:t>
             </a:fld>
             <a:endParaRPr lang="en-US"/>
           </a:p>
@@ -1004,7 +1000,7 @@
           <a:p>
             <a:fld id="{78C97017-6FC3-485B-9764-EAC9E56C1D49}" type="datetimeFigureOut">
               <a:rPr lang="en-US" smtClean="0"/>
-              <a:t>7/20/17</a:t>
+              <a:t>4/15/2018</a:t>
             </a:fld>
             <a:endParaRPr lang="en-US"/>
           </a:p>
@@ -1172,7 +1168,7 @@
           <a:p>
             <a:fld id="{78C97017-6FC3-485B-9764-EAC9E56C1D49}" type="datetimeFigureOut">
               <a:rPr lang="en-US" smtClean="0"/>
-              <a:t>7/20/17</a:t>
+              <a:t>4/15/2018</a:t>
             </a:fld>
             <a:endParaRPr lang="en-US"/>
           </a:p>
@@ -1417,7 +1413,7 @@
           <a:p>
             <a:fld id="{78C97017-6FC3-485B-9764-EAC9E56C1D49}" type="datetimeFigureOut">
               <a:rPr lang="en-US" smtClean="0"/>
-              <a:t>7/20/17</a:t>
+              <a:t>4/15/2018</a:t>
             </a:fld>
             <a:endParaRPr lang="en-US"/>
           </a:p>
@@ -1702,7 +1698,7 @@
           <a:p>
             <a:fld id="{78C97017-6FC3-485B-9764-EAC9E56C1D49}" type="datetimeFigureOut">
               <a:rPr lang="en-US" smtClean="0"/>
-              <a:t>7/20/17</a:t>
+              <a:t>4/15/2018</a:t>
             </a:fld>
             <a:endParaRPr lang="en-US"/>
           </a:p>
@@ -2121,7 +2117,7 @@
           <a:p>
             <a:fld id="{78C97017-6FC3-485B-9764-EAC9E56C1D49}" type="datetimeFigureOut">
               <a:rPr lang="en-US" smtClean="0"/>
-              <a:t>7/20/17</a:t>
+              <a:t>4/15/2018</a:t>
             </a:fld>
             <a:endParaRPr lang="en-US"/>
           </a:p>
@@ -2238,7 +2234,7 @@
           <a:p>
             <a:fld id="{78C97017-6FC3-485B-9764-EAC9E56C1D49}" type="datetimeFigureOut">
               <a:rPr lang="en-US" smtClean="0"/>
-              <a:t>7/20/17</a:t>
+              <a:t>4/15/2018</a:t>
             </a:fld>
             <a:endParaRPr lang="en-US"/>
           </a:p>
@@ -2333,7 +2329,7 @@
           <a:p>
             <a:fld id="{78C97017-6FC3-485B-9764-EAC9E56C1D49}" type="datetimeFigureOut">
               <a:rPr lang="en-US" smtClean="0"/>
-              <a:t>7/20/17</a:t>
+              <a:t>4/15/2018</a:t>
             </a:fld>
             <a:endParaRPr lang="en-US"/>
           </a:p>
@@ -2608,7 +2604,7 @@
           <a:p>
             <a:fld id="{78C97017-6FC3-485B-9764-EAC9E56C1D49}" type="datetimeFigureOut">
               <a:rPr lang="en-US" smtClean="0"/>
-              <a:t>7/20/17</a:t>
+              <a:t>4/15/2018</a:t>
             </a:fld>
             <a:endParaRPr lang="en-US"/>
           </a:p>
@@ -2860,7 +2856,7 @@
           <a:p>
             <a:fld id="{78C97017-6FC3-485B-9764-EAC9E56C1D49}" type="datetimeFigureOut">
               <a:rPr lang="en-US" smtClean="0"/>
-              <a:t>7/20/17</a:t>
+              <a:t>4/15/2018</a:t>
             </a:fld>
             <a:endParaRPr lang="en-US"/>
           </a:p>
@@ -3071,7 +3067,7 @@
           <a:p>
             <a:fld id="{78C97017-6FC3-485B-9764-EAC9E56C1D49}" type="datetimeFigureOut">
               <a:rPr lang="en-US" smtClean="0"/>
-              <a:t>7/20/17</a:t>
+              <a:t>4/15/2018</a:t>
             </a:fld>
             <a:endParaRPr lang="en-US"/>
           </a:p>
@@ -3607,7 +3603,7 @@
           <a:p>
             <a:pPr algn="ctr"/>
             <a:r>
-              <a:rPr lang="en-US" sz="1050" b="1" dirty="0" err="1" smtClean="0">
+              <a:rPr lang="en-US" sz="1050" b="1" dirty="0" err="1">
                 <a:solidFill>
                   <a:srgbClr val="0070C0"/>
                 </a:solidFill>
@@ -3939,18 +3935,13 @@
           <a:p>
             <a:pPr algn="ctr"/>
             <a:r>
-              <a:rPr lang="en-US" sz="1050" dirty="0" err="1" smtClean="0">
+              <a:rPr lang="en-US" sz="1050" dirty="0">
                 <a:solidFill>
                   <a:schemeClr val="bg1"/>
                 </a:solidFill>
               </a:rPr>
-              <a:t>AddressBook</a:t>
-            </a:r>
-            <a:endParaRPr lang="en-US" sz="1050" dirty="0">
-              <a:solidFill>
-                <a:schemeClr val="bg1"/>
-              </a:solidFill>
-            </a:endParaRPr>
+              <a:t>Catalogue</a:t>
+            </a:r>
           </a:p>
           <a:p>
             <a:pPr algn="ctr"/>
@@ -5517,7 +5508,7 @@
           <p:cNvPr id="97" name="Rectangle 96">
             <a:extLst>
               <a:ext uri="{FF2B5EF4-FFF2-40B4-BE49-F238E27FC236}">
-                <a16:creationId xmlns="" xmlns:a16="http://schemas.microsoft.com/office/drawing/2014/main" id="{AADE6A0C-89AB-467B-8CEA-5FCF36CE0D21}"/>
+                <a16:creationId xmlns:a16="http://schemas.microsoft.com/office/drawing/2014/main" id="{AADE6A0C-89AB-467B-8CEA-5FCF36CE0D21}"/>
               </a:ext>
             </a:extLst>
           </p:cNvPr>
@@ -5815,7 +5806,7 @@
           <a:p>
             <a:pPr algn="ctr"/>
             <a:r>
-              <a:rPr lang="en-US" sz="1050" b="1" dirty="0" err="1" smtClean="0">
+              <a:rPr lang="en-US" sz="1050" b="1" dirty="0" err="1">
                 <a:solidFill>
                   <a:schemeClr val="bg1"/>
                 </a:solidFill>
@@ -6165,7 +6156,7 @@
           <a:p>
             <a:pPr algn="ctr"/>
             <a:r>
-              <a:rPr lang="en-US" sz="1050" dirty="0" err="1" smtClean="0">
+              <a:rPr lang="en-US" sz="1050" dirty="0" err="1">
                 <a:solidFill>
                   <a:schemeClr val="bg1"/>
                 </a:solidFill>
@@ -6173,7 +6164,7 @@
               <a:t>XYZCommand</a:t>
             </a:r>
             <a:r>
-              <a:rPr lang="en-US" sz="1050" dirty="0" smtClean="0">
+              <a:rPr lang="en-US" sz="1050" dirty="0">
                 <a:solidFill>
                   <a:schemeClr val="bg1"/>
                 </a:solidFill>
@@ -6181,7 +6172,7 @@
               <a:t> = </a:t>
             </a:r>
             <a:r>
-              <a:rPr lang="en-US" sz="1050" dirty="0" err="1" smtClean="0">
+              <a:rPr lang="en-US" sz="1050" dirty="0" err="1">
                 <a:solidFill>
                   <a:schemeClr val="bg1"/>
                 </a:solidFill>
@@ -6189,7 +6180,7 @@
               <a:t>AddCommand</a:t>
             </a:r>
             <a:r>
-              <a:rPr lang="en-US" sz="1050" dirty="0" smtClean="0">
+              <a:rPr lang="en-US" sz="1050" dirty="0">
                 <a:solidFill>
                   <a:schemeClr val="bg1"/>
                 </a:solidFill>
@@ -6197,7 +6188,7 @@
               <a:t>, </a:t>
             </a:r>
             <a:r>
-              <a:rPr lang="en-US" sz="1050" dirty="0" err="1" smtClean="0">
+              <a:rPr lang="en-US" sz="1050" dirty="0" err="1">
                 <a:solidFill>
                   <a:schemeClr val="bg1"/>
                 </a:solidFill>
@@ -6205,18 +6196,13 @@
               <a:t>FindCommand</a:t>
             </a:r>
             <a:r>
-              <a:rPr lang="en-US" sz="1050" dirty="0" smtClean="0">
+              <a:rPr lang="en-US" sz="1050" dirty="0">
                 <a:solidFill>
                   <a:schemeClr val="bg1"/>
                 </a:solidFill>
               </a:rPr>
               <a:t>, etc.</a:t>
             </a:r>
-            <a:endParaRPr lang="en-US" sz="1050" dirty="0">
-              <a:solidFill>
-                <a:schemeClr val="bg1"/>
-              </a:solidFill>
-            </a:endParaRPr>
           </a:p>
         </p:txBody>
       </p:sp>
@@ -6264,14 +6250,14 @@
           <a:p>
             <a:pPr algn="ctr"/>
             <a:r>
-              <a:rPr lang="en-US" sz="1050" dirty="0" err="1" smtClean="0">
+              <a:rPr lang="en-US" sz="1050" dirty="0" err="1">
                 <a:solidFill>
                   <a:schemeClr val="bg1"/>
                 </a:solidFill>
               </a:rPr>
               <a:t>UndoRedo</a:t>
             </a:r>
-            <a:endParaRPr lang="en-US" sz="1050" dirty="0" smtClean="0">
+            <a:endParaRPr lang="en-US" sz="1050" dirty="0">
               <a:solidFill>
                 <a:schemeClr val="bg1"/>
               </a:solidFill>
@@ -6280,7 +6266,7 @@
           <a:p>
             <a:pPr algn="ctr"/>
             <a:r>
-              <a:rPr lang="en-US" sz="1050" dirty="0" smtClean="0">
+              <a:rPr lang="en-US" sz="1050" dirty="0">
                 <a:solidFill>
                   <a:schemeClr val="bg1"/>
                 </a:solidFill>

</xml_diff>

<commit_message>
Documentation updates (Notifications) (#260)
* Edit UGDG
* Edit Diagrams
* Notifications and various doc fixes
</commit_message>
<xml_diff>
--- a/docs/diagrams/LogicComponentClassDiagram.pptx
+++ b/docs/diagrams/LogicComponentClassDiagram.pptx
@@ -208,7 +208,7 @@
           <a:p>
             <a:fld id="{F5CC4B3F-88C1-4FFA-B1B6-F41C21DC6924}" type="datetimeFigureOut">
               <a:rPr lang="en-US" smtClean="0"/>
-              <a:t>4/8/2018</a:t>
+              <a:t>4/15/2018</a:t>
             </a:fld>
             <a:endParaRPr lang="en-US"/>
           </a:p>
@@ -654,7 +654,7 @@
           <a:p>
             <a:fld id="{78C97017-6FC3-485B-9764-EAC9E56C1D49}" type="datetimeFigureOut">
               <a:rPr lang="en-US" smtClean="0"/>
-              <a:t>4/8/2018</a:t>
+              <a:t>4/15/2018</a:t>
             </a:fld>
             <a:endParaRPr lang="en-US"/>
           </a:p>
@@ -822,7 +822,7 @@
           <a:p>
             <a:fld id="{78C97017-6FC3-485B-9764-EAC9E56C1D49}" type="datetimeFigureOut">
               <a:rPr lang="en-US" smtClean="0"/>
-              <a:t>4/8/2018</a:t>
+              <a:t>4/15/2018</a:t>
             </a:fld>
             <a:endParaRPr lang="en-US"/>
           </a:p>
@@ -1000,7 +1000,7 @@
           <a:p>
             <a:fld id="{78C97017-6FC3-485B-9764-EAC9E56C1D49}" type="datetimeFigureOut">
               <a:rPr lang="en-US" smtClean="0"/>
-              <a:t>4/8/2018</a:t>
+              <a:t>4/15/2018</a:t>
             </a:fld>
             <a:endParaRPr lang="en-US"/>
           </a:p>
@@ -1168,7 +1168,7 @@
           <a:p>
             <a:fld id="{78C97017-6FC3-485B-9764-EAC9E56C1D49}" type="datetimeFigureOut">
               <a:rPr lang="en-US" smtClean="0"/>
-              <a:t>4/8/2018</a:t>
+              <a:t>4/15/2018</a:t>
             </a:fld>
             <a:endParaRPr lang="en-US"/>
           </a:p>
@@ -1413,7 +1413,7 @@
           <a:p>
             <a:fld id="{78C97017-6FC3-485B-9764-EAC9E56C1D49}" type="datetimeFigureOut">
               <a:rPr lang="en-US" smtClean="0"/>
-              <a:t>4/8/2018</a:t>
+              <a:t>4/15/2018</a:t>
             </a:fld>
             <a:endParaRPr lang="en-US"/>
           </a:p>
@@ -1698,7 +1698,7 @@
           <a:p>
             <a:fld id="{78C97017-6FC3-485B-9764-EAC9E56C1D49}" type="datetimeFigureOut">
               <a:rPr lang="en-US" smtClean="0"/>
-              <a:t>4/8/2018</a:t>
+              <a:t>4/15/2018</a:t>
             </a:fld>
             <a:endParaRPr lang="en-US"/>
           </a:p>
@@ -2117,7 +2117,7 @@
           <a:p>
             <a:fld id="{78C97017-6FC3-485B-9764-EAC9E56C1D49}" type="datetimeFigureOut">
               <a:rPr lang="en-US" smtClean="0"/>
-              <a:t>4/8/2018</a:t>
+              <a:t>4/15/2018</a:t>
             </a:fld>
             <a:endParaRPr lang="en-US"/>
           </a:p>
@@ -2234,7 +2234,7 @@
           <a:p>
             <a:fld id="{78C97017-6FC3-485B-9764-EAC9E56C1D49}" type="datetimeFigureOut">
               <a:rPr lang="en-US" smtClean="0"/>
-              <a:t>4/8/2018</a:t>
+              <a:t>4/15/2018</a:t>
             </a:fld>
             <a:endParaRPr lang="en-US"/>
           </a:p>
@@ -2329,7 +2329,7 @@
           <a:p>
             <a:fld id="{78C97017-6FC3-485B-9764-EAC9E56C1D49}" type="datetimeFigureOut">
               <a:rPr lang="en-US" smtClean="0"/>
-              <a:t>4/8/2018</a:t>
+              <a:t>4/15/2018</a:t>
             </a:fld>
             <a:endParaRPr lang="en-US"/>
           </a:p>
@@ -2604,7 +2604,7 @@
           <a:p>
             <a:fld id="{78C97017-6FC3-485B-9764-EAC9E56C1D49}" type="datetimeFigureOut">
               <a:rPr lang="en-US" smtClean="0"/>
-              <a:t>4/8/2018</a:t>
+              <a:t>4/15/2018</a:t>
             </a:fld>
             <a:endParaRPr lang="en-US"/>
           </a:p>
@@ -2856,7 +2856,7 @@
           <a:p>
             <a:fld id="{78C97017-6FC3-485B-9764-EAC9E56C1D49}" type="datetimeFigureOut">
               <a:rPr lang="en-US" smtClean="0"/>
-              <a:t>4/8/2018</a:t>
+              <a:t>4/15/2018</a:t>
             </a:fld>
             <a:endParaRPr lang="en-US"/>
           </a:p>
@@ -3067,7 +3067,7 @@
           <a:p>
             <a:fld id="{78C97017-6FC3-485B-9764-EAC9E56C1D49}" type="datetimeFigureOut">
               <a:rPr lang="en-US" smtClean="0"/>
-              <a:t>4/8/2018</a:t>
+              <a:t>4/15/2018</a:t>
             </a:fld>
             <a:endParaRPr lang="en-US"/>
           </a:p>
@@ -3903,7 +3903,7 @@
         </p:nvSpPr>
         <p:spPr>
           <a:xfrm>
-            <a:off x="3255418" y="3554995"/>
+            <a:off x="3250751" y="3793708"/>
             <a:ext cx="1045323" cy="384497"/>
           </a:xfrm>
           <a:prstGeom prst="rect">
@@ -4506,7 +4506,7 @@
         </p:nvSpPr>
         <p:spPr>
           <a:xfrm>
-            <a:off x="3048000" y="3733800"/>
+            <a:off x="2982987" y="3882971"/>
             <a:ext cx="131116" cy="230832"/>
           </a:xfrm>
           <a:prstGeom prst="rect">
@@ -4586,7 +4586,7 @@
         </p:nvSpPr>
         <p:spPr>
           <a:xfrm>
-            <a:off x="3174214" y="1862795"/>
+            <a:off x="3594406" y="1524000"/>
             <a:ext cx="751107" cy="346760"/>
           </a:xfrm>
           <a:prstGeom prst="rect">
@@ -4666,7 +4666,7 @@
         </p:nvSpPr>
         <p:spPr>
           <a:xfrm>
-            <a:off x="2246808" y="2451748"/>
+            <a:off x="2667000" y="2112953"/>
             <a:ext cx="723671" cy="159925"/>
           </a:xfrm>
           <a:prstGeom prst="rect">
@@ -4726,7 +4726,7 @@
         </p:nvSpPr>
         <p:spPr>
           <a:xfrm>
-            <a:off x="3179115" y="2841725"/>
+            <a:off x="3599307" y="2502930"/>
             <a:ext cx="815919" cy="283820"/>
           </a:xfrm>
           <a:prstGeom prst="rect">
@@ -4791,7 +4791,7 @@
         </p:nvSpPr>
         <p:spPr>
           <a:xfrm>
-            <a:off x="3186326" y="3190882"/>
+            <a:off x="3606518" y="2852087"/>
             <a:ext cx="731636" cy="283820"/>
           </a:xfrm>
           <a:prstGeom prst="rect">
@@ -4860,7 +4860,7 @@
         </p:nvCxnSpPr>
         <p:spPr>
           <a:xfrm rot="10800000">
-            <a:off x="2608645" y="2611673"/>
+            <a:off x="3028837" y="2272878"/>
             <a:ext cx="570471" cy="371962"/>
           </a:xfrm>
           <a:prstGeom prst="bentConnector2">
@@ -4906,7 +4906,7 @@
         </p:nvCxnSpPr>
         <p:spPr>
           <a:xfrm rot="10800000" flipV="1">
-            <a:off x="2608644" y="2036174"/>
+            <a:off x="3028836" y="1697379"/>
             <a:ext cx="565570" cy="415573"/>
           </a:xfrm>
           <a:prstGeom prst="bentConnector2">
@@ -5150,8 +5150,8 @@
         </p:nvCxnSpPr>
         <p:spPr>
           <a:xfrm flipV="1">
-            <a:off x="6066328" y="2913532"/>
-            <a:ext cx="811946" cy="659"/>
+            <a:off x="6142879" y="2913532"/>
+            <a:ext cx="735395" cy="1177"/>
           </a:xfrm>
           <a:prstGeom prst="bentConnector3">
             <a:avLst>
@@ -5193,7 +5193,7 @@
         </p:nvSpPr>
         <p:spPr>
           <a:xfrm>
-            <a:off x="3174214" y="2370131"/>
+            <a:off x="3594406" y="2031336"/>
             <a:ext cx="750156" cy="340758"/>
           </a:xfrm>
           <a:prstGeom prst="rect">
@@ -5272,7 +5272,7 @@
         </p:nvCxnSpPr>
         <p:spPr>
           <a:xfrm rot="10800000">
-            <a:off x="2970480" y="2531712"/>
+            <a:off x="3390672" y="2192917"/>
             <a:ext cx="203735" cy="8799"/>
           </a:xfrm>
           <a:prstGeom prst="bentConnector3">
@@ -5320,7 +5320,7 @@
         </p:nvCxnSpPr>
         <p:spPr>
           <a:xfrm rot="5400000">
-            <a:off x="3469242" y="2289605"/>
+            <a:off x="3889434" y="1950810"/>
             <a:ext cx="160576" cy="476"/>
           </a:xfrm>
           <a:prstGeom prst="bentConnector3">
@@ -5733,7 +5733,7 @@
         </p:nvCxnSpPr>
         <p:spPr>
           <a:xfrm>
-            <a:off x="2893971" y="3687139"/>
+            <a:off x="2889304" y="3883413"/>
             <a:ext cx="361447" cy="0"/>
           </a:xfrm>
           <a:prstGeom prst="line">
@@ -5772,7 +5772,7 @@
         </p:nvSpPr>
         <p:spPr>
           <a:xfrm flipH="1">
-            <a:off x="5074342" y="2740811"/>
+            <a:off x="5150893" y="2741329"/>
             <a:ext cx="991986" cy="346760"/>
           </a:xfrm>
           <a:prstGeom prst="rect">
@@ -5843,13 +5843,14 @@
           <p:cNvCxnSpPr>
             <a:cxnSpLocks/>
             <a:stCxn id="42" idx="3"/>
+            <a:endCxn id="109" idx="3"/>
           </p:cNvCxnSpPr>
           <p:nvPr/>
         </p:nvCxnSpPr>
         <p:spPr>
           <a:xfrm rot="10800000">
-            <a:off x="3917734" y="2058661"/>
-            <a:ext cx="1156608" cy="855530"/>
+            <a:off x="4344563" y="2201715"/>
+            <a:ext cx="806331" cy="712994"/>
           </a:xfrm>
           <a:prstGeom prst="bentConnector3">
             <a:avLst>
@@ -5890,13 +5891,14 @@
           <p:cNvCxnSpPr>
             <a:cxnSpLocks/>
             <a:stCxn id="42" idx="3"/>
+            <a:endCxn id="56" idx="3"/>
           </p:cNvCxnSpPr>
           <p:nvPr/>
         </p:nvCxnSpPr>
         <p:spPr>
           <a:xfrm rot="10800000">
-            <a:off x="3921964" y="2540511"/>
-            <a:ext cx="1152379" cy="373681"/>
+            <a:off x="4345513" y="1697381"/>
+            <a:ext cx="805380" cy="1217329"/>
           </a:xfrm>
           <a:prstGeom prst="bentConnector3">
             <a:avLst>
@@ -5942,13 +5944,13 @@
           <p:nvPr/>
         </p:nvCxnSpPr>
         <p:spPr>
-          <a:xfrm rot="10800000" flipV="1">
-            <a:off x="3995034" y="2914191"/>
-            <a:ext cx="1079308" cy="69444"/>
+          <a:xfrm rot="10800000">
+            <a:off x="4415227" y="2644841"/>
+            <a:ext cx="735667" cy="269869"/>
           </a:xfrm>
           <a:prstGeom prst="bentConnector3">
             <a:avLst>
-              <a:gd name="adj1" fmla="val 54073"/>
+              <a:gd name="adj1" fmla="val 55179"/>
             </a:avLst>
           </a:prstGeom>
           <a:ln w="19050">
@@ -5985,13 +5987,14 @@
           <p:cNvCxnSpPr>
             <a:cxnSpLocks/>
             <a:stCxn id="42" idx="3"/>
+            <a:endCxn id="62" idx="3"/>
           </p:cNvCxnSpPr>
           <p:nvPr/>
         </p:nvCxnSpPr>
         <p:spPr>
           <a:xfrm rot="10800000" flipV="1">
-            <a:off x="3930422" y="2914191"/>
-            <a:ext cx="1143921" cy="439870"/>
+            <a:off x="4338155" y="2914709"/>
+            <a:ext cx="812739" cy="79288"/>
           </a:xfrm>
           <a:prstGeom prst="bentConnector3">
             <a:avLst>
@@ -6037,8 +6040,8 @@
         </p:nvCxnSpPr>
         <p:spPr>
           <a:xfrm flipV="1">
-            <a:off x="4300741" y="3087571"/>
-            <a:ext cx="1269594" cy="659673"/>
+            <a:off x="4296074" y="3088089"/>
+            <a:ext cx="1350812" cy="897868"/>
           </a:xfrm>
           <a:prstGeom prst="bentConnector2">
             <a:avLst/>
@@ -6080,7 +6083,7 @@
         </p:nvCxnSpPr>
         <p:spPr>
           <a:xfrm rot="16200000" flipH="1">
-            <a:off x="5451193" y="2621669"/>
+            <a:off x="5527744" y="2622187"/>
             <a:ext cx="234926" cy="3358"/>
           </a:xfrm>
           <a:prstGeom prst="bentConnector3">
@@ -6215,7 +6218,7 @@
         </p:nvSpPr>
         <p:spPr>
           <a:xfrm>
-            <a:off x="2334221" y="3058789"/>
+            <a:off x="2207393" y="3040423"/>
             <a:ext cx="758695" cy="346760"/>
           </a:xfrm>
           <a:prstGeom prst="rect">
@@ -6292,7 +6295,7 @@
         </p:nvCxnSpPr>
         <p:spPr>
           <a:xfrm flipV="1">
-            <a:off x="2713568" y="3405549"/>
+            <a:off x="2586740" y="3387183"/>
             <a:ext cx="1" cy="177981"/>
           </a:xfrm>
           <a:prstGeom prst="straightConnector1">
@@ -6330,7 +6333,7 @@
         </p:nvSpPr>
         <p:spPr>
           <a:xfrm>
-            <a:off x="2724741" y="3418256"/>
+            <a:off x="2586740" y="3408435"/>
             <a:ext cx="131116" cy="230832"/>
           </a:xfrm>
           <a:prstGeom prst="rect">
@@ -6361,6 +6364,172 @@
           </a:p>
         </p:txBody>
       </p:sp>
+      <p:sp>
+        <p:nvSpPr>
+          <p:cNvPr id="90" name="Rectangle 62">
+            <a:extLst>
+              <a:ext uri="{FF2B5EF4-FFF2-40B4-BE49-F238E27FC236}">
+                <a16:creationId xmlns:a16="http://schemas.microsoft.com/office/drawing/2014/main" id="{69F42414-9E99-4004-A5DC-3D16956EE9A9}"/>
+              </a:ext>
+            </a:extLst>
+          </p:cNvPr>
+          <p:cNvSpPr/>
+          <p:nvPr/>
+        </p:nvSpPr>
+        <p:spPr>
+          <a:xfrm>
+            <a:off x="3260611" y="3359913"/>
+            <a:ext cx="758695" cy="346760"/>
+          </a:xfrm>
+          <a:prstGeom prst="rect">
+            <a:avLst/>
+          </a:prstGeom>
+          <a:solidFill>
+            <a:srgbClr val="0070C0"/>
+          </a:solidFill>
+          <a:ln w="19050">
+            <a:solidFill>
+              <a:srgbClr val="0070C0"/>
+            </a:solidFill>
+          </a:ln>
+          <a:effectLst/>
+        </p:spPr>
+        <p:style>
+          <a:lnRef idx="1">
+            <a:schemeClr val="accent2"/>
+          </a:lnRef>
+          <a:fillRef idx="2">
+            <a:schemeClr val="accent2"/>
+          </a:fillRef>
+          <a:effectRef idx="1">
+            <a:schemeClr val="accent2"/>
+          </a:effectRef>
+          <a:fontRef idx="minor">
+            <a:schemeClr val="dk1"/>
+          </a:fontRef>
+        </p:style>
+        <p:txBody>
+          <a:bodyPr rtlCol="0" anchor="ctr"/>
+          <a:lstStyle/>
+          <a:p>
+            <a:pPr algn="ctr"/>
+            <a:r>
+              <a:rPr lang="en-US" sz="1050" dirty="0">
+                <a:solidFill>
+                  <a:schemeClr val="bg1"/>
+                </a:solidFill>
+              </a:rPr>
+              <a:t>Rule</a:t>
+            </a:r>
+          </a:p>
+          <a:p>
+            <a:pPr algn="ctr"/>
+            <a:r>
+              <a:rPr lang="en-US" sz="1050" dirty="0">
+                <a:solidFill>
+                  <a:schemeClr val="bg1"/>
+                </a:solidFill>
+              </a:rPr>
+              <a:t>Checker</a:t>
+            </a:r>
+            <a:endParaRPr lang="en-SG" sz="1050" dirty="0">
+              <a:solidFill>
+                <a:schemeClr val="bg1"/>
+              </a:solidFill>
+            </a:endParaRPr>
+          </a:p>
+        </p:txBody>
+      </p:sp>
+      <p:sp>
+        <p:nvSpPr>
+          <p:cNvPr id="93" name="TextBox 92">
+            <a:extLst>
+              <a:ext uri="{FF2B5EF4-FFF2-40B4-BE49-F238E27FC236}">
+                <a16:creationId xmlns:a16="http://schemas.microsoft.com/office/drawing/2014/main" id="{F52473CD-5ACD-4EC2-8D13-7102C39B8356}"/>
+              </a:ext>
+            </a:extLst>
+          </p:cNvPr>
+          <p:cNvSpPr txBox="1"/>
+          <p:nvPr/>
+        </p:nvSpPr>
+        <p:spPr>
+          <a:xfrm>
+            <a:off x="2988329" y="3616256"/>
+            <a:ext cx="131116" cy="230832"/>
+          </a:xfrm>
+          <a:prstGeom prst="rect">
+            <a:avLst/>
+          </a:prstGeom>
+          <a:noFill/>
+        </p:spPr>
+        <p:txBody>
+          <a:bodyPr wrap="square" lIns="0" tIns="0" rIns="0" bIns="0" rtlCol="0">
+            <a:noAutofit/>
+          </a:bodyPr>
+          <a:lstStyle/>
+          <a:p>
+            <a:pPr algn="r"/>
+            <a:r>
+              <a:rPr lang="en-US" sz="1100" dirty="0">
+                <a:solidFill>
+                  <a:srgbClr val="0070C0"/>
+                </a:solidFill>
+              </a:rPr>
+              <a:t>1</a:t>
+            </a:r>
+            <a:endParaRPr lang="en-SG" sz="1100" dirty="0">
+              <a:solidFill>
+                <a:srgbClr val="0070C0"/>
+              </a:solidFill>
+            </a:endParaRPr>
+          </a:p>
+        </p:txBody>
+      </p:sp>
+      <p:cxnSp>
+        <p:nvCxnSpPr>
+          <p:cNvPr id="94" name="Straight Connector 93">
+            <a:extLst>
+              <a:ext uri="{FF2B5EF4-FFF2-40B4-BE49-F238E27FC236}">
+                <a16:creationId xmlns:a16="http://schemas.microsoft.com/office/drawing/2014/main" id="{63F8CD36-015F-40BC-B4F4-B4C536B72678}"/>
+              </a:ext>
+            </a:extLst>
+          </p:cNvPr>
+          <p:cNvCxnSpPr/>
+          <p:nvPr/>
+        </p:nvCxnSpPr>
+        <p:spPr>
+          <a:xfrm>
+            <a:off x="2894646" y="3616698"/>
+            <a:ext cx="361447" cy="0"/>
+          </a:xfrm>
+          <a:prstGeom prst="line">
+            <a:avLst/>
+          </a:prstGeom>
+          <a:ln w="19050">
+            <a:solidFill>
+              <a:srgbClr val="0070C0"/>
+            </a:solidFill>
+            <a:prstDash val="solid"/>
+            <a:headEnd type="none" w="med" len="med"/>
+            <a:tailEnd type="arrow" w="med" len="med"/>
+          </a:ln>
+          <a:effectLst/>
+        </p:spPr>
+        <p:style>
+          <a:lnRef idx="1">
+            <a:schemeClr val="accent2"/>
+          </a:lnRef>
+          <a:fillRef idx="2">
+            <a:schemeClr val="accent2"/>
+          </a:fillRef>
+          <a:effectRef idx="1">
+            <a:schemeClr val="accent2"/>
+          </a:effectRef>
+          <a:fontRef idx="minor">
+            <a:schemeClr val="dk1"/>
+          </a:fontRef>
+        </p:style>
+      </p:cxnSp>
     </p:spTree>
     <p:extLst>
       <p:ext uri="{BB962C8B-B14F-4D97-AF65-F5344CB8AC3E}">

</xml_diff>